<commit_message>
Fixed link in quick start guide to tutorial.
git-svn-id: https://sbia-svn.uphs.upenn.edu/projects/BASIS/trunk@1182 3c61e6fb-ae43-4039-8cf7-c895b3257837
</commit_message>
<xml_diff>
--- a/doc/tutorials/BASIS Quick Start Guide - 02 Getting Started.pptx
+++ b/doc/tutorials/BASIS Quick Start Guide - 02 Getting Started.pptx
@@ -11372,11 +11372,7 @@
           <a:p>
             <a:r>
               <a:rPr lang="en-US" dirty="0" smtClean="0"/>
-              <a:t>The .in </a:t>
-            </a:r>
-            <a:r>
-              <a:rPr lang="en-US" dirty="0" smtClean="0"/>
-              <a:t>Suffix</a:t>
+              <a:t>The .in Suffix</a:t>
             </a:r>
             <a:endParaRPr lang="en-US" dirty="0"/>
           </a:p>
@@ -11771,11 +11767,7 @@
           <a:p>
             <a:r>
               <a:rPr lang="en-US" sz="2400" dirty="0" smtClean="0"/>
-              <a:t>Now build the libraries</a:t>
-            </a:r>
-            <a:r>
-              <a:rPr lang="en-US" sz="2400" dirty="0" smtClean="0"/>
-              <a:t>:</a:t>
+              <a:t>Now build the libraries:</a:t>
             </a:r>
           </a:p>
           <a:p>
@@ -11858,13 +11850,7 @@
               <a:rPr lang="en-US" sz="2400" dirty="0" smtClean="0">
                 <a:cs typeface="Courier New" pitchFamily="49" charset="0"/>
               </a:rPr>
-              <a:t>And install </a:t>
-            </a:r>
-            <a:r>
-              <a:rPr lang="en-US" sz="2400" dirty="0" smtClean="0">
-                <a:cs typeface="Courier New" pitchFamily="49" charset="0"/>
-              </a:rPr>
-              <a:t>them:</a:t>
+              <a:t>And install them:</a:t>
             </a:r>
           </a:p>
           <a:p>
@@ -12077,15 +12063,7 @@
             <a:pPr algn="ctr"/>
             <a:r>
               <a:rPr lang="en-US" sz="2400" dirty="0" smtClean="0"/>
-              <a:t>If this was not clear enough </a:t>
-            </a:r>
-            <a:r>
-              <a:rPr lang="en-US" sz="2400" dirty="0" smtClean="0"/>
-              <a:t>or </a:t>
-            </a:r>
-            <a:r>
-              <a:rPr lang="en-US" sz="2400" dirty="0" smtClean="0"/>
-              <a:t>you would like to know more, have a look at the corresponding </a:t>
+              <a:t>If this was not clear enough or you would like to know more, have a look at the corresponding </a:t>
             </a:r>
             <a:r>
               <a:rPr lang="en-US" sz="2400" b="1" dirty="0" smtClean="0">
@@ -12178,15 +12156,7 @@
           <a:p>
             <a:r>
               <a:rPr lang="en-US" dirty="0" smtClean="0"/>
-              <a:t>What is this </a:t>
-            </a:r>
-            <a:r>
-              <a:rPr lang="en-US" dirty="0" smtClean="0"/>
-              <a:t>quick </a:t>
-            </a:r>
-            <a:r>
-              <a:rPr lang="en-US" dirty="0" smtClean="0"/>
-              <a:t>start guide about?</a:t>
+              <a:t>What is this quick start guide about?</a:t>
             </a:r>
             <a:endParaRPr lang="en-US" dirty="0"/>
           </a:p>

</xml_diff>